<commit_message>
Update .docx and .pptx files
</commit_message>
<xml_diff>
--- a/МАНУ2020.pptx
+++ b/МАНУ2020.pptx
@@ -279,7 +279,7 @@
           <a:p>
             <a:fld id="{F3B1270B-825F-4A6F-BFBD-8E5D97593686}" type="datetimeFigureOut">
               <a:rPr lang="uk-UA" smtClean="0"/>
-              <a:t>27.02.2020</a:t>
+              <a:t>29.02.2020</a:t>
             </a:fld>
             <a:endParaRPr lang="uk-UA"/>
           </a:p>
@@ -479,7 +479,7 @@
           <a:p>
             <a:fld id="{F3B1270B-825F-4A6F-BFBD-8E5D97593686}" type="datetimeFigureOut">
               <a:rPr lang="uk-UA" smtClean="0"/>
-              <a:t>27.02.2020</a:t>
+              <a:t>29.02.2020</a:t>
             </a:fld>
             <a:endParaRPr lang="uk-UA"/>
           </a:p>
@@ -689,7 +689,7 @@
           <a:p>
             <a:fld id="{F3B1270B-825F-4A6F-BFBD-8E5D97593686}" type="datetimeFigureOut">
               <a:rPr lang="uk-UA" smtClean="0"/>
-              <a:t>27.02.2020</a:t>
+              <a:t>29.02.2020</a:t>
             </a:fld>
             <a:endParaRPr lang="uk-UA"/>
           </a:p>
@@ -889,7 +889,7 @@
           <a:p>
             <a:fld id="{F3B1270B-825F-4A6F-BFBD-8E5D97593686}" type="datetimeFigureOut">
               <a:rPr lang="uk-UA" smtClean="0"/>
-              <a:t>27.02.2020</a:t>
+              <a:t>29.02.2020</a:t>
             </a:fld>
             <a:endParaRPr lang="uk-UA"/>
           </a:p>
@@ -1165,7 +1165,7 @@
           <a:p>
             <a:fld id="{F3B1270B-825F-4A6F-BFBD-8E5D97593686}" type="datetimeFigureOut">
               <a:rPr lang="uk-UA" smtClean="0"/>
-              <a:t>27.02.2020</a:t>
+              <a:t>29.02.2020</a:t>
             </a:fld>
             <a:endParaRPr lang="uk-UA"/>
           </a:p>
@@ -1433,7 +1433,7 @@
           <a:p>
             <a:fld id="{F3B1270B-825F-4A6F-BFBD-8E5D97593686}" type="datetimeFigureOut">
               <a:rPr lang="uk-UA" smtClean="0"/>
-              <a:t>27.02.2020</a:t>
+              <a:t>29.02.2020</a:t>
             </a:fld>
             <a:endParaRPr lang="uk-UA"/>
           </a:p>
@@ -1848,7 +1848,7 @@
           <a:p>
             <a:fld id="{F3B1270B-825F-4A6F-BFBD-8E5D97593686}" type="datetimeFigureOut">
               <a:rPr lang="uk-UA" smtClean="0"/>
-              <a:t>27.02.2020</a:t>
+              <a:t>29.02.2020</a:t>
             </a:fld>
             <a:endParaRPr lang="uk-UA"/>
           </a:p>
@@ -1990,7 +1990,7 @@
           <a:p>
             <a:fld id="{F3B1270B-825F-4A6F-BFBD-8E5D97593686}" type="datetimeFigureOut">
               <a:rPr lang="uk-UA" smtClean="0"/>
-              <a:t>27.02.2020</a:t>
+              <a:t>29.02.2020</a:t>
             </a:fld>
             <a:endParaRPr lang="uk-UA"/>
           </a:p>
@@ -2103,7 +2103,7 @@
           <a:p>
             <a:fld id="{F3B1270B-825F-4A6F-BFBD-8E5D97593686}" type="datetimeFigureOut">
               <a:rPr lang="uk-UA" smtClean="0"/>
-              <a:t>27.02.2020</a:t>
+              <a:t>29.02.2020</a:t>
             </a:fld>
             <a:endParaRPr lang="uk-UA"/>
           </a:p>
@@ -2416,7 +2416,7 @@
           <a:p>
             <a:fld id="{F3B1270B-825F-4A6F-BFBD-8E5D97593686}" type="datetimeFigureOut">
               <a:rPr lang="uk-UA" smtClean="0"/>
-              <a:t>27.02.2020</a:t>
+              <a:t>29.02.2020</a:t>
             </a:fld>
             <a:endParaRPr lang="uk-UA"/>
           </a:p>
@@ -2705,7 +2705,7 @@
           <a:p>
             <a:fld id="{F3B1270B-825F-4A6F-BFBD-8E5D97593686}" type="datetimeFigureOut">
               <a:rPr lang="uk-UA" smtClean="0"/>
-              <a:t>27.02.2020</a:t>
+              <a:t>29.02.2020</a:t>
             </a:fld>
             <a:endParaRPr lang="uk-UA"/>
           </a:p>
@@ -2948,7 +2948,7 @@
           <a:p>
             <a:fld id="{F3B1270B-825F-4A6F-BFBD-8E5D97593686}" type="datetimeFigureOut">
               <a:rPr lang="uk-UA" smtClean="0"/>
-              <a:t>27.02.2020</a:t>
+              <a:t>29.02.2020</a:t>
             </a:fld>
             <a:endParaRPr lang="uk-UA"/>
           </a:p>
@@ -5147,22 +5147,6 @@
               <a:t>), </a:t>
             </a:r>
             <a:r>
-              <a:rPr lang="en-US" b="1" dirty="0" err="1"/>
-              <a:t>InputField</a:t>
-            </a:r>
-            <a:r>
-              <a:rPr lang="en-US" dirty="0"/>
-              <a:t> (in </a:t>
-            </a:r>
-            <a:r>
-              <a:rPr lang="en-US" b="1" dirty="0"/>
-              <a:t>Interface</a:t>
-            </a:r>
-            <a:r>
-              <a:rPr lang="en-US" dirty="0"/>
-              <a:t>), </a:t>
-            </a:r>
-            <a:r>
               <a:rPr lang="en-US" b="1" dirty="0"/>
               <a:t>Space</a:t>
             </a:r>
@@ -5358,19 +5342,15 @@
             </a:r>
             <a:r>
               <a:rPr lang="uk-UA" dirty="0"/>
-              <a:t> реалізує кнопку, а </a:t>
-            </a:r>
-            <a:r>
-              <a:rPr lang="en-US" b="1" dirty="0" err="1"/>
-              <a:t>InputField</a:t>
+              <a:t> реалізує кнопку</a:t>
             </a:r>
             <a:r>
               <a:rPr lang="en-US" dirty="0"/>
-              <a:t> – </a:t>
+              <a:t> </a:t>
             </a:r>
             <a:r>
               <a:rPr lang="uk-UA" dirty="0"/>
-              <a:t>поле введення.</a:t>
+              <a:t>та поле введення.</a:t>
             </a:r>
             <a:r>
               <a:rPr lang="en-US" dirty="0"/>

</xml_diff>